<commit_message>
leg assembly and 1st EGR455 HW
</commit_message>
<xml_diff>
--- a/IDEAlab/Jacob Summer Update V.pptx
+++ b/IDEAlab/Jacob Summer Update V.pptx
@@ -120,6 +120,10 @@
 </p:presentation>
 </file>
 
+<file path=ppt/revisionInfo.xml><?xml version="1.0" encoding="utf-8"?>
+<p1510:revInfo xmlns:a="http://schemas.openxmlformats.org/drawingml/2006/main" xmlns:r="http://schemas.openxmlformats.org/officeDocument/2006/relationships" xmlns:p1510="http://schemas.microsoft.com/office/powerpoint/2015/10/main"/>
+</file>
+
 <file path=ppt/notesMasters/notesMaster1.xml><?xml version="1.0" encoding="utf-8"?>
 <p:notesMaster xmlns:a="http://schemas.openxmlformats.org/drawingml/2006/main" xmlns:r="http://schemas.openxmlformats.org/officeDocument/2006/relationships" xmlns:p="http://schemas.openxmlformats.org/presentationml/2006/main">
   <p:cSld>
@@ -202,7 +206,7 @@
           <a:p>
             <a:fld id="{2ED7F260-2CD9-45F9-AE57-C10EE5666276}" type="datetimeFigureOut">
               <a:rPr lang="en-US" smtClean="0"/>
-              <a:t>8/18/2017</a:t>
+              <a:t>8/21/2017</a:t>
             </a:fld>
             <a:endParaRPr lang="en-US"/>
           </a:p>
@@ -526,6 +530,13 @@
               <a:t> sim at angle </a:t>
             </a:r>
           </a:p>
+          <a:p>
+            <a:r>
+              <a:rPr lang="en-US"/>
+              <a:t>.18571</a:t>
+            </a:r>
+            <a:endParaRPr lang="en-US" dirty="0"/>
+          </a:p>
         </p:txBody>
       </p:sp>
       <p:sp>
@@ -695,7 +706,7 @@
           <a:p>
             <a:fld id="{CFC36377-5E45-413A-82FF-B7E6E5303FD2}" type="datetimeFigureOut">
               <a:rPr lang="en-US" smtClean="0"/>
-              <a:t>8/18/2017</a:t>
+              <a:t>8/21/2017</a:t>
             </a:fld>
             <a:endParaRPr lang="en-US"/>
           </a:p>
@@ -870,7 +881,7 @@
           <a:p>
             <a:fld id="{CFC36377-5E45-413A-82FF-B7E6E5303FD2}" type="datetimeFigureOut">
               <a:rPr lang="en-US" smtClean="0"/>
-              <a:t>8/18/2017</a:t>
+              <a:t>8/21/2017</a:t>
             </a:fld>
             <a:endParaRPr lang="en-US"/>
           </a:p>
@@ -1050,7 +1061,7 @@
           <a:p>
             <a:fld id="{CFC36377-5E45-413A-82FF-B7E6E5303FD2}" type="datetimeFigureOut">
               <a:rPr lang="en-US" smtClean="0"/>
-              <a:t>8/18/2017</a:t>
+              <a:t>8/21/2017</a:t>
             </a:fld>
             <a:endParaRPr lang="en-US"/>
           </a:p>
@@ -1225,7 +1236,7 @@
           <a:p>
             <a:fld id="{CFC36377-5E45-413A-82FF-B7E6E5303FD2}" type="datetimeFigureOut">
               <a:rPr lang="en-US" smtClean="0"/>
-              <a:t>8/18/2017</a:t>
+              <a:t>8/21/2017</a:t>
             </a:fld>
             <a:endParaRPr lang="en-US"/>
           </a:p>
@@ -1471,7 +1482,7 @@
           <a:p>
             <a:fld id="{CFC36377-5E45-413A-82FF-B7E6E5303FD2}" type="datetimeFigureOut">
               <a:rPr lang="en-US" smtClean="0"/>
-              <a:t>8/18/2017</a:t>
+              <a:t>8/21/2017</a:t>
             </a:fld>
             <a:endParaRPr lang="en-US"/>
           </a:p>
@@ -1708,7 +1719,7 @@
           <a:p>
             <a:fld id="{CFC36377-5E45-413A-82FF-B7E6E5303FD2}" type="datetimeFigureOut">
               <a:rPr lang="en-US" smtClean="0"/>
-              <a:t>8/18/2017</a:t>
+              <a:t>8/21/2017</a:t>
             </a:fld>
             <a:endParaRPr lang="en-US"/>
           </a:p>
@@ -2075,7 +2086,7 @@
           <a:p>
             <a:fld id="{CFC36377-5E45-413A-82FF-B7E6E5303FD2}" type="datetimeFigureOut">
               <a:rPr lang="en-US" smtClean="0"/>
-              <a:t>8/18/2017</a:t>
+              <a:t>8/21/2017</a:t>
             </a:fld>
             <a:endParaRPr lang="en-US"/>
           </a:p>
@@ -2193,7 +2204,7 @@
           <a:p>
             <a:fld id="{CFC36377-5E45-413A-82FF-B7E6E5303FD2}" type="datetimeFigureOut">
               <a:rPr lang="en-US" smtClean="0"/>
-              <a:t>8/18/2017</a:t>
+              <a:t>8/21/2017</a:t>
             </a:fld>
             <a:endParaRPr lang="en-US"/>
           </a:p>
@@ -2288,7 +2299,7 @@
           <a:p>
             <a:fld id="{CFC36377-5E45-413A-82FF-B7E6E5303FD2}" type="datetimeFigureOut">
               <a:rPr lang="en-US" smtClean="0"/>
-              <a:t>8/18/2017</a:t>
+              <a:t>8/21/2017</a:t>
             </a:fld>
             <a:endParaRPr lang="en-US"/>
           </a:p>
@@ -2565,7 +2576,7 @@
           <a:p>
             <a:fld id="{CFC36377-5E45-413A-82FF-B7E6E5303FD2}" type="datetimeFigureOut">
               <a:rPr lang="en-US" smtClean="0"/>
-              <a:t>8/18/2017</a:t>
+              <a:t>8/21/2017</a:t>
             </a:fld>
             <a:endParaRPr lang="en-US"/>
           </a:p>
@@ -2822,7 +2833,7 @@
           <a:p>
             <a:fld id="{CFC36377-5E45-413A-82FF-B7E6E5303FD2}" type="datetimeFigureOut">
               <a:rPr lang="en-US" smtClean="0"/>
-              <a:t>8/18/2017</a:t>
+              <a:t>8/21/2017</a:t>
             </a:fld>
             <a:endParaRPr lang="en-US"/>
           </a:p>
@@ -3035,7 +3046,7 @@
           <a:p>
             <a:fld id="{CFC36377-5E45-413A-82FF-B7E6E5303FD2}" type="datetimeFigureOut">
               <a:rPr lang="en-US" smtClean="0"/>
-              <a:t>8/18/2017</a:t>
+              <a:t>8/21/2017</a:t>
             </a:fld>
             <a:endParaRPr lang="en-US"/>
           </a:p>

</xml_diff>